<commit_message>
finalzied the summary slides for meeting with Volker
</commit_message>
<xml_diff>
--- a/slides/short-summary.pptx
+++ b/slides/short-summary.pptx
@@ -108,6 +108,11 @@
       </a:defRPr>
     </a:lvl9pPr>
   </p:defaultTextStyle>
+  <p:extLst>
+    <p:ext uri="{EFAFB233-063F-42B5-8137-9DF3F51BA10A}">
+      <p15:sldGuideLst xmlns:p15="http://schemas.microsoft.com/office/powerpoint/2012/main"/>
+    </p:ext>
+  </p:extLst>
 </p:presentation>
 </file>
 
@@ -3073,7 +3078,11 @@
           <a:p>
             <a:r>
               <a:rPr lang="en-US" dirty="0" smtClean="0"/>
-              <a:t>Experiment Database</a:t>
+              <a:t>Experiment </a:t>
+            </a:r>
+            <a:r>
+              <a:rPr lang="en-US" dirty="0" smtClean="0"/>
+              <a:t>Database (ED)</a:t>
             </a:r>
             <a:endParaRPr lang="en-US" dirty="0"/>
           </a:p>
@@ -3091,33 +3100,182 @@
         </p:nvSpPr>
         <p:spPr/>
         <p:txBody>
-          <a:bodyPr/>
-          <a:lstStyle/>
-          <a:p>
-            <a:r>
-              <a:rPr lang="en-US" dirty="0" smtClean="0"/>
-              <a:t>Contains meta-data of machine learning experiments</a:t>
-            </a:r>
-          </a:p>
-          <a:p>
-            <a:r>
-              <a:rPr lang="en-US" dirty="0" smtClean="0"/>
+          <a:bodyPr>
+            <a:normAutofit fontScale="92500" lnSpcReduction="10000"/>
+          </a:bodyPr>
+          <a:lstStyle/>
+          <a:p>
+            <a:r>
+              <a:rPr lang="en-US" sz="2400" dirty="0" smtClean="0"/>
+              <a:t>Contains meta-data of machine learning </a:t>
+            </a:r>
+            <a:r>
+              <a:rPr lang="en-US" sz="2400" dirty="0"/>
+              <a:t>experiments about the datasets, models, transformations, and </a:t>
+            </a:r>
+            <a:r>
+              <a:rPr lang="en-US" sz="2400" dirty="0" smtClean="0"/>
+              <a:t>evaluations</a:t>
+            </a:r>
+            <a:endParaRPr lang="en-US" sz="2400" dirty="0" smtClean="0"/>
+          </a:p>
+          <a:p>
+            <a:r>
+              <a:rPr lang="en-US" sz="2400" dirty="0" smtClean="0"/>
               <a:t>Based on </a:t>
             </a:r>
             <a:r>
-              <a:rPr lang="en-US" dirty="0" err="1" smtClean="0"/>
-              <a:t>Schelter</a:t>
-            </a:r>
-            <a:r>
-              <a:rPr lang="en-US" dirty="0" smtClean="0"/>
-              <a:t>, et al., [1] database schema for storing experiments’ meta-data</a:t>
-            </a:r>
-          </a:p>
-          <a:p>
-            <a:r>
-              <a:rPr lang="en-US" dirty="0" smtClean="0"/>
-              <a:t>Their meta-data extraction system collects information about the datasets, models, transformations, and evaluations</a:t>
-            </a:r>
+              <a:rPr lang="en-US" sz="2400" dirty="0" smtClean="0"/>
+              <a:t>[</a:t>
+            </a:r>
+            <a:r>
+              <a:rPr lang="en-US" sz="2400" dirty="0" smtClean="0"/>
+              <a:t>1] </a:t>
+            </a:r>
+            <a:endParaRPr lang="en-US" sz="2400" dirty="0" smtClean="0"/>
+          </a:p>
+          <a:p>
+            <a:r>
+              <a:rPr lang="en-US" sz="2400" dirty="0" smtClean="0">
+                <a:solidFill>
+                  <a:schemeClr val="accent6">
+                    <a:lumMod val="75000"/>
+                  </a:schemeClr>
+                </a:solidFill>
+              </a:rPr>
+              <a:t>Workload Optimizations using ED:</a:t>
+            </a:r>
+          </a:p>
+          <a:p>
+            <a:pPr lvl="1"/>
+            <a:r>
+              <a:rPr lang="en-US" dirty="0" smtClean="0">
+                <a:solidFill>
+                  <a:schemeClr val="accent6">
+                    <a:lumMod val="75000"/>
+                  </a:schemeClr>
+                </a:solidFill>
+              </a:rPr>
+              <a:t>Reuse of existing models</a:t>
+            </a:r>
+          </a:p>
+          <a:p>
+            <a:pPr lvl="1"/>
+            <a:r>
+              <a:rPr lang="en-US" dirty="0" smtClean="0">
+                <a:solidFill>
+                  <a:schemeClr val="accent6">
+                    <a:lumMod val="75000"/>
+                  </a:schemeClr>
+                </a:solidFill>
+              </a:rPr>
+              <a:t>Materialization of transformed datasets</a:t>
+            </a:r>
+          </a:p>
+          <a:p>
+            <a:pPr lvl="1"/>
+            <a:r>
+              <a:rPr lang="en-US" dirty="0" smtClean="0">
+                <a:solidFill>
+                  <a:schemeClr val="accent6">
+                    <a:lumMod val="75000"/>
+                  </a:schemeClr>
+                </a:solidFill>
+              </a:rPr>
+              <a:t>Multi-query optimization</a:t>
+            </a:r>
+          </a:p>
+          <a:p>
+            <a:pPr lvl="1"/>
+            <a:r>
+              <a:rPr lang="en-US" dirty="0" smtClean="0">
+                <a:solidFill>
+                  <a:schemeClr val="accent6">
+                    <a:lumMod val="75000"/>
+                  </a:schemeClr>
+                </a:solidFill>
+              </a:rPr>
+              <a:t>Warm-starting</a:t>
+            </a:r>
+          </a:p>
+          <a:p>
+            <a:pPr lvl="1"/>
+            <a:r>
+              <a:rPr lang="en-US" dirty="0" smtClean="0">
+                <a:solidFill>
+                  <a:schemeClr val="accent6">
+                    <a:lumMod val="75000"/>
+                  </a:schemeClr>
+                </a:solidFill>
+              </a:rPr>
+              <a:t>Efficient data transformation</a:t>
+            </a:r>
+          </a:p>
+          <a:p>
+            <a:pPr lvl="1"/>
+            <a:r>
+              <a:rPr lang="en-US" dirty="0" smtClean="0">
+                <a:solidFill>
+                  <a:schemeClr val="accent6">
+                    <a:lumMod val="75000"/>
+                  </a:schemeClr>
+                </a:solidFill>
+              </a:rPr>
+              <a:t>Efficient hyper-parameter tuning</a:t>
+            </a:r>
+          </a:p>
+          <a:p>
+            <a:pPr lvl="1"/>
+            <a:r>
+              <a:rPr lang="en-US" dirty="0" smtClean="0">
+                <a:solidFill>
+                  <a:schemeClr val="accent6">
+                    <a:lumMod val="75000"/>
+                  </a:schemeClr>
+                </a:solidFill>
+              </a:rPr>
+              <a:t>Efficient multi-model training</a:t>
+            </a:r>
+          </a:p>
+          <a:p>
+            <a:pPr lvl="1"/>
+            <a:endParaRPr lang="en-US" dirty="0" smtClean="0">
+              <a:solidFill>
+                <a:schemeClr val="accent6">
+                  <a:lumMod val="75000"/>
+                </a:schemeClr>
+              </a:solidFill>
+            </a:endParaRPr>
+          </a:p>
+          <a:p>
+            <a:pPr lvl="1"/>
+            <a:endParaRPr lang="en-US" dirty="0" smtClean="0">
+              <a:solidFill>
+                <a:schemeClr val="accent6">
+                  <a:lumMod val="75000"/>
+                </a:schemeClr>
+              </a:solidFill>
+            </a:endParaRPr>
+          </a:p>
+          <a:p>
+            <a:pPr lvl="1"/>
+            <a:endParaRPr lang="en-US" dirty="0" smtClean="0">
+              <a:solidFill>
+                <a:schemeClr val="accent6">
+                  <a:lumMod val="75000"/>
+                </a:schemeClr>
+              </a:solidFill>
+            </a:endParaRPr>
+          </a:p>
+          <a:p>
+            <a:pPr lvl="1"/>
+            <a:endParaRPr lang="en-US" dirty="0" smtClean="0">
+              <a:solidFill>
+                <a:schemeClr val="accent6">
+                  <a:lumMod val="75000"/>
+                </a:schemeClr>
+              </a:solidFill>
+            </a:endParaRPr>
           </a:p>
         </p:txBody>
       </p:sp>
@@ -3220,18 +3378,30 @@
             <p:ph type="title"/>
           </p:nvPr>
         </p:nvSpPr>
-        <p:spPr/>
-        <p:txBody>
-          <a:bodyPr/>
+        <p:spPr>
+          <a:xfrm>
+            <a:off x="838200" y="365125"/>
+            <a:ext cx="10515600" cy="735667"/>
+          </a:xfrm>
+        </p:spPr>
+        <p:txBody>
+          <a:bodyPr>
+            <a:normAutofit/>
+          </a:bodyPr>
           <a:lstStyle/>
           <a:p>
             <a:r>
               <a:rPr lang="en-US" dirty="0" smtClean="0"/>
-              <a:t>Machine Learning Workloads</a:t>
-            </a:r>
-            <a:br>
+              <a:t>Categories of Machine </a:t>
+            </a:r>
+            <a:r>
               <a:rPr lang="en-US" dirty="0" smtClean="0"/>
-            </a:br>
+              <a:t>Learning </a:t>
+            </a:r>
+            <a:r>
+              <a:rPr lang="en-US" dirty="0" smtClean="0"/>
+              <a:t>Workloads</a:t>
+            </a:r>
             <a:endParaRPr lang="en-US" dirty="0"/>
           </a:p>
         </p:txBody>
@@ -3249,7 +3419,7 @@
         <p:spPr>
           <a:xfrm>
             <a:off x="838200" y="2227217"/>
-            <a:ext cx="3237411" cy="3949746"/>
+            <a:ext cx="3237411" cy="4500154"/>
           </a:xfrm>
         </p:spPr>
         <p:txBody>
@@ -3259,54 +3429,130 @@
           <a:lstStyle/>
           <a:p>
             <a:r>
-              <a:rPr lang="en-US" sz="2200" dirty="0" smtClean="0"/>
-              <a:t>Multi-user (from tens to thousands of users)</a:t>
-            </a:r>
-          </a:p>
-          <a:p>
-            <a:r>
-              <a:rPr lang="en-US" sz="2200" dirty="0" smtClean="0"/>
+              <a:rPr lang="en-US" sz="2400" dirty="0" smtClean="0"/>
+              <a:t>Description:</a:t>
+            </a:r>
+          </a:p>
+          <a:p>
+            <a:pPr lvl="1"/>
+            <a:r>
+              <a:rPr lang="en-US" sz="1900" dirty="0" smtClean="0"/>
+              <a:t>Multi-user </a:t>
+            </a:r>
+            <a:r>
+              <a:rPr lang="en-US" sz="1900" dirty="0" smtClean="0"/>
+              <a:t>(from tens to thousands of users)</a:t>
+            </a:r>
+          </a:p>
+          <a:p>
+            <a:pPr lvl="1"/>
+            <a:r>
+              <a:rPr lang="en-US" sz="1900" dirty="0" smtClean="0"/>
               <a:t>Primarily consists of repeated data preprocessing and data transformations</a:t>
             </a:r>
           </a:p>
           <a:p>
-            <a:r>
-              <a:rPr lang="en-US" sz="2200" dirty="0" smtClean="0"/>
+            <a:pPr lvl="1"/>
+            <a:r>
+              <a:rPr lang="en-US" sz="1900" dirty="0" smtClean="0"/>
               <a:t>Aggressive Hyper-parameter tuning and model evaluation</a:t>
             </a:r>
           </a:p>
           <a:p>
             <a:r>
-              <a:rPr lang="en-US" sz="2200" dirty="0" smtClean="0"/>
-              <a:t>Use case: </a:t>
-            </a:r>
-            <a:r>
-              <a:rPr lang="en-US" sz="2200" dirty="0" err="1" smtClean="0"/>
-              <a:t>OpenML</a:t>
-            </a:r>
-            <a:r>
-              <a:rPr lang="en-US" sz="2200" dirty="0" smtClean="0"/>
-              <a:t>[2], </a:t>
-            </a:r>
-            <a:r>
-              <a:rPr lang="en-US" sz="2200" dirty="0" err="1" smtClean="0"/>
-              <a:t>Kaggle</a:t>
-            </a:r>
-            <a:r>
-              <a:rPr lang="en-US" sz="2200" dirty="0" smtClean="0"/>
-              <a:t>[3]</a:t>
-            </a:r>
-          </a:p>
-          <a:p>
-            <a:r>
-              <a:rPr lang="en-US" sz="2200" dirty="0" smtClean="0">
+              <a:rPr lang="en-US" sz="2400" dirty="0" smtClean="0">
                 <a:solidFill>
                   <a:schemeClr val="accent6">
                     <a:lumMod val="75000"/>
                   </a:schemeClr>
                 </a:solidFill>
               </a:rPr>
-              <a:t>Opportunities for Reuse, materialization, multi-query optimization, and warm-starting</a:t>
+              <a:t>Optimizations using ED:</a:t>
+            </a:r>
+          </a:p>
+          <a:p>
+            <a:pPr lvl="1"/>
+            <a:r>
+              <a:rPr lang="en-US" sz="1900" dirty="0" smtClean="0">
+                <a:solidFill>
+                  <a:schemeClr val="accent6">
+                    <a:lumMod val="75000"/>
+                  </a:schemeClr>
+                </a:solidFill>
+              </a:rPr>
+              <a:t>Reuse </a:t>
+            </a:r>
+          </a:p>
+          <a:p>
+            <a:pPr lvl="1"/>
+            <a:r>
+              <a:rPr lang="en-US" sz="1900" dirty="0" smtClean="0">
+                <a:solidFill>
+                  <a:schemeClr val="accent6">
+                    <a:lumMod val="75000"/>
+                  </a:schemeClr>
+                </a:solidFill>
+              </a:rPr>
+              <a:t>Materialization</a:t>
+            </a:r>
+          </a:p>
+          <a:p>
+            <a:pPr lvl="1"/>
+            <a:r>
+              <a:rPr lang="en-US" sz="1900" dirty="0">
+                <a:solidFill>
+                  <a:schemeClr val="accent6">
+                    <a:lumMod val="75000"/>
+                  </a:schemeClr>
+                </a:solidFill>
+              </a:rPr>
+              <a:t>M</a:t>
+            </a:r>
+            <a:r>
+              <a:rPr lang="en-US" sz="1900" dirty="0" smtClean="0">
+                <a:solidFill>
+                  <a:schemeClr val="accent6">
+                    <a:lumMod val="75000"/>
+                  </a:schemeClr>
+                </a:solidFill>
+              </a:rPr>
+              <a:t>ulti-query optimization</a:t>
+            </a:r>
+          </a:p>
+          <a:p>
+            <a:pPr lvl="1"/>
+            <a:r>
+              <a:rPr lang="en-US" sz="1900" dirty="0" smtClean="0">
+                <a:solidFill>
+                  <a:schemeClr val="accent6">
+                    <a:lumMod val="75000"/>
+                  </a:schemeClr>
+                </a:solidFill>
+              </a:rPr>
+              <a:t>W</a:t>
+            </a:r>
+            <a:r>
+              <a:rPr lang="en-US" sz="1900" dirty="0" smtClean="0">
+                <a:solidFill>
+                  <a:schemeClr val="accent6">
+                    <a:lumMod val="75000"/>
+                  </a:schemeClr>
+                </a:solidFill>
+              </a:rPr>
+              <a:t>arm-starting</a:t>
+            </a:r>
+          </a:p>
+          <a:p>
+            <a:pPr lvl="1"/>
+            <a:r>
+              <a:rPr lang="en-US" sz="1900" dirty="0" smtClean="0">
+                <a:solidFill>
+                  <a:schemeClr val="accent6">
+                    <a:lumMod val="75000"/>
+                  </a:schemeClr>
+                </a:solidFill>
+              </a:rPr>
+              <a:t>Decreasing the search space of hyper-parameters</a:t>
             </a:r>
           </a:p>
         </p:txBody>
@@ -3324,7 +3570,7 @@
         <p:spPr>
           <a:xfrm>
             <a:off x="4477294" y="2227217"/>
-            <a:ext cx="3237411" cy="3949746"/>
+            <a:ext cx="3237411" cy="4500154"/>
           </a:xfrm>
         </p:spPr>
         <p:txBody>
@@ -3341,53 +3587,56 @@
                   </a:schemeClr>
                 </a:solidFill>
               </a:rPr>
-              <a:t>Multi-user (tens of users)</a:t>
-            </a:r>
-          </a:p>
-          <a:p>
-            <a:r>
-              <a:rPr lang="en-US" sz="2000" dirty="0" smtClean="0">
+              <a:t>Description:</a:t>
+            </a:r>
+          </a:p>
+          <a:p>
+            <a:pPr lvl="1"/>
+            <a:r>
+              <a:rPr lang="en-US" sz="1600" dirty="0" smtClean="0">
                 <a:solidFill>
                   <a:schemeClr val="tx1">
                     <a:alpha val="50000"/>
                   </a:schemeClr>
                 </a:solidFill>
               </a:rPr>
-              <a:t>Incremental improvement of existing data processing pipelines and ML models</a:t>
-            </a:r>
-          </a:p>
-          <a:p>
-            <a:r>
-              <a:rPr lang="en-US" sz="2000" dirty="0" smtClean="0">
+              <a:t>Multi-user </a:t>
+            </a:r>
+            <a:r>
+              <a:rPr lang="en-US" sz="1600" dirty="0" smtClean="0">
                 <a:solidFill>
                   <a:schemeClr val="tx1">
                     <a:alpha val="50000"/>
                   </a:schemeClr>
                 </a:solidFill>
               </a:rPr>
-              <a:t>Retrain models and pipelines (typically daily)</a:t>
-            </a:r>
-          </a:p>
-          <a:p>
-            <a:r>
-              <a:rPr lang="en-US" sz="2000" dirty="0" smtClean="0">
+              <a:t>(tens of users)</a:t>
+            </a:r>
+          </a:p>
+          <a:p>
+            <a:pPr lvl="1"/>
+            <a:r>
+              <a:rPr lang="en-US" sz="1600" dirty="0" smtClean="0">
                 <a:solidFill>
                   <a:schemeClr val="tx1">
                     <a:alpha val="50000"/>
                   </a:schemeClr>
                 </a:solidFill>
               </a:rPr>
-              <a:t>Use case </a:t>
-            </a:r>
-            <a:r>
-              <a:rPr lang="en-US" sz="2000" dirty="0" smtClean="0">
+              <a:t>Incremental improvement of existing data processing pipelines and ML models</a:t>
+            </a:r>
+          </a:p>
+          <a:p>
+            <a:pPr lvl="1"/>
+            <a:r>
+              <a:rPr lang="en-US" sz="1600" dirty="0" smtClean="0">
                 <a:solidFill>
                   <a:schemeClr val="tx1">
                     <a:alpha val="50000"/>
                   </a:schemeClr>
                 </a:solidFill>
               </a:rPr>
-              <a:t>: Industry</a:t>
+              <a:t>Retrain models and pipelines (typically daily)</a:t>
             </a:r>
           </a:p>
           <a:p>
@@ -3400,9 +3649,142 @@
                   </a:schemeClr>
                 </a:solidFill>
               </a:rPr>
-              <a:t>Speed up in data preprocessing, decreasing the search space of hyper-parameters, multi-model training, and warm-starting</a:t>
-            </a:r>
-            <a:endParaRPr lang="en-US" sz="2000" dirty="0">
+              <a:t>Optimizations using ED:</a:t>
+            </a:r>
+          </a:p>
+          <a:p>
+            <a:pPr lvl="1"/>
+            <a:r>
+              <a:rPr lang="en-US" sz="1600" dirty="0" smtClean="0">
+                <a:solidFill>
+                  <a:schemeClr val="accent6">
+                    <a:lumMod val="75000"/>
+                    <a:alpha val="50000"/>
+                  </a:schemeClr>
+                </a:solidFill>
+              </a:rPr>
+              <a:t>Speed </a:t>
+            </a:r>
+            <a:r>
+              <a:rPr lang="en-US" sz="1600" dirty="0" smtClean="0">
+                <a:solidFill>
+                  <a:schemeClr val="accent6">
+                    <a:lumMod val="75000"/>
+                    <a:alpha val="50000"/>
+                  </a:schemeClr>
+                </a:solidFill>
+              </a:rPr>
+              <a:t>up in </a:t>
+            </a:r>
+            <a:r>
+              <a:rPr lang="en-US" sz="1600" dirty="0" smtClean="0">
+                <a:solidFill>
+                  <a:schemeClr val="accent6">
+                    <a:lumMod val="75000"/>
+                    <a:alpha val="50000"/>
+                  </a:schemeClr>
+                </a:solidFill>
+              </a:rPr>
+              <a:t>data transformation</a:t>
+            </a:r>
+          </a:p>
+          <a:p>
+            <a:pPr lvl="1"/>
+            <a:r>
+              <a:rPr lang="en-US" sz="1600" dirty="0">
+                <a:solidFill>
+                  <a:schemeClr val="accent6">
+                    <a:lumMod val="75000"/>
+                    <a:alpha val="50000"/>
+                  </a:schemeClr>
+                </a:solidFill>
+              </a:rPr>
+              <a:t>D</a:t>
+            </a:r>
+            <a:r>
+              <a:rPr lang="en-US" sz="1600" dirty="0" smtClean="0">
+                <a:solidFill>
+                  <a:schemeClr val="accent6">
+                    <a:lumMod val="75000"/>
+                    <a:alpha val="50000"/>
+                  </a:schemeClr>
+                </a:solidFill>
+              </a:rPr>
+              <a:t>ecreasing </a:t>
+            </a:r>
+            <a:r>
+              <a:rPr lang="en-US" sz="1600" dirty="0" smtClean="0">
+                <a:solidFill>
+                  <a:schemeClr val="accent6">
+                    <a:lumMod val="75000"/>
+                    <a:alpha val="50000"/>
+                  </a:schemeClr>
+                </a:solidFill>
+              </a:rPr>
+              <a:t>the search space of </a:t>
+            </a:r>
+            <a:r>
+              <a:rPr lang="en-US" sz="1600" dirty="0" smtClean="0">
+                <a:solidFill>
+                  <a:schemeClr val="accent6">
+                    <a:lumMod val="75000"/>
+                    <a:alpha val="50000"/>
+                  </a:schemeClr>
+                </a:solidFill>
+              </a:rPr>
+              <a:t>hyper-parameters</a:t>
+            </a:r>
+          </a:p>
+          <a:p>
+            <a:pPr lvl="1"/>
+            <a:r>
+              <a:rPr lang="en-US" sz="1600" dirty="0">
+                <a:solidFill>
+                  <a:schemeClr val="accent6">
+                    <a:lumMod val="75000"/>
+                    <a:alpha val="50000"/>
+                  </a:schemeClr>
+                </a:solidFill>
+              </a:rPr>
+              <a:t>M</a:t>
+            </a:r>
+            <a:r>
+              <a:rPr lang="en-US" sz="1600" dirty="0" smtClean="0">
+                <a:solidFill>
+                  <a:schemeClr val="accent6">
+                    <a:lumMod val="75000"/>
+                    <a:alpha val="50000"/>
+                  </a:schemeClr>
+                </a:solidFill>
+              </a:rPr>
+              <a:t>ulti-model training</a:t>
+            </a:r>
+          </a:p>
+          <a:p>
+            <a:pPr lvl="1"/>
+            <a:r>
+              <a:rPr lang="en-US" sz="1600" dirty="0">
+                <a:solidFill>
+                  <a:schemeClr val="accent6">
+                    <a:lumMod val="75000"/>
+                    <a:alpha val="50000"/>
+                  </a:schemeClr>
+                </a:solidFill>
+              </a:rPr>
+              <a:t>W</a:t>
+            </a:r>
+            <a:r>
+              <a:rPr lang="en-US" sz="1600" dirty="0" smtClean="0">
+                <a:solidFill>
+                  <a:schemeClr val="accent6">
+                    <a:lumMod val="75000"/>
+                    <a:alpha val="50000"/>
+                  </a:schemeClr>
+                </a:solidFill>
+              </a:rPr>
+              <a:t>arm-starting</a:t>
+            </a:r>
+            <a:endParaRPr lang="en-US" sz="1600" dirty="0">
               <a:solidFill>
                 <a:schemeClr val="accent6">
                   <a:lumMod val="75000"/>
@@ -3426,7 +3808,7 @@
         <p:spPr>
           <a:xfrm>
             <a:off x="8116389" y="2227217"/>
-            <a:ext cx="3237411" cy="3949746"/>
+            <a:ext cx="3237411" cy="4500154"/>
           </a:xfrm>
         </p:spPr>
         <p:txBody>
@@ -3436,17 +3818,15 @@
           <a:lstStyle/>
           <a:p>
             <a:r>
-              <a:rPr lang="en-US" sz="2000" dirty="0" smtClean="0">
+              <a:rPr lang="en-US" sz="2000" dirty="0">
                 <a:solidFill>
                   <a:schemeClr val="tx1">
                     <a:alpha val="50000"/>
                   </a:schemeClr>
                 </a:solidFill>
               </a:rPr>
-              <a:t>Real-time (or near real-time) data processing</a:t>
-            </a:r>
-          </a:p>
-          <a:p>
+              <a:t>Description</a:t>
+            </a:r>
             <a:r>
               <a:rPr lang="en-US" sz="2000" dirty="0" smtClean="0">
                 <a:solidFill>
@@ -3455,29 +3835,50 @@
                   </a:schemeClr>
                 </a:solidFill>
               </a:rPr>
-              <a:t>Online ML models</a:t>
-            </a:r>
-          </a:p>
-          <a:p>
-            <a:r>
-              <a:rPr lang="en-US" sz="2000" dirty="0" smtClean="0">
+              <a:t>:</a:t>
+            </a:r>
+            <a:endParaRPr lang="en-US" sz="2000" dirty="0" smtClean="0">
+              <a:solidFill>
+                <a:schemeClr val="tx1">
+                  <a:alpha val="50000"/>
+                </a:schemeClr>
+              </a:solidFill>
+            </a:endParaRPr>
+          </a:p>
+          <a:p>
+            <a:pPr lvl="1"/>
+            <a:r>
+              <a:rPr lang="en-US" sz="1600" dirty="0" smtClean="0">
                 <a:solidFill>
                   <a:schemeClr val="tx1">
                     <a:alpha val="50000"/>
                   </a:schemeClr>
                 </a:solidFill>
               </a:rPr>
-              <a:t>Use case </a:t>
-            </a:r>
-            <a:r>
-              <a:rPr lang="en-US" sz="2000" dirty="0" smtClean="0">
+              <a:t>Real-time </a:t>
+            </a:r>
+            <a:r>
+              <a:rPr lang="en-US" sz="1600" dirty="0" smtClean="0">
                 <a:solidFill>
                   <a:schemeClr val="tx1">
                     <a:alpha val="50000"/>
                   </a:schemeClr>
                 </a:solidFill>
               </a:rPr>
-              <a:t>: Industry</a:t>
+              <a:t>(or near real-time) data processing</a:t>
+            </a:r>
+          </a:p>
+          <a:p>
+            <a:pPr lvl="1"/>
+            <a:r>
+              <a:rPr lang="en-US" sz="1600" dirty="0" smtClean="0">
+                <a:solidFill>
+                  <a:schemeClr val="tx1">
+                    <a:alpha val="50000"/>
+                  </a:schemeClr>
+                </a:solidFill>
+              </a:rPr>
+              <a:t>Online ML models</a:t>
             </a:r>
           </a:p>
           <a:p>
@@ -3490,9 +3891,136 @@
                   </a:schemeClr>
                 </a:solidFill>
               </a:rPr>
-              <a:t>Speed up in data preprocessing, multi-model training, and fast detection of model quality degradation</a:t>
-            </a:r>
-            <a:endParaRPr lang="en-US" sz="2000" dirty="0">
+              <a:t>Optimizations </a:t>
+            </a:r>
+            <a:r>
+              <a:rPr lang="en-US" sz="2000" dirty="0">
+                <a:solidFill>
+                  <a:schemeClr val="accent6">
+                    <a:lumMod val="75000"/>
+                    <a:alpha val="50000"/>
+                  </a:schemeClr>
+                </a:solidFill>
+              </a:rPr>
+              <a:t>using ED</a:t>
+            </a:r>
+            <a:r>
+              <a:rPr lang="en-US" sz="2000" dirty="0" smtClean="0">
+                <a:solidFill>
+                  <a:schemeClr val="accent6">
+                    <a:lumMod val="75000"/>
+                    <a:alpha val="50000"/>
+                  </a:schemeClr>
+                </a:solidFill>
+              </a:rPr>
+              <a:t>:</a:t>
+            </a:r>
+            <a:endParaRPr lang="en-US" sz="2000" dirty="0" smtClean="0">
+              <a:solidFill>
+                <a:schemeClr val="accent6">
+                  <a:lumMod val="75000"/>
+                  <a:alpha val="50000"/>
+                </a:schemeClr>
+              </a:solidFill>
+            </a:endParaRPr>
+          </a:p>
+          <a:p>
+            <a:pPr lvl="1"/>
+            <a:r>
+              <a:rPr lang="en-US" sz="1600" dirty="0" smtClean="0">
+                <a:solidFill>
+                  <a:schemeClr val="accent6">
+                    <a:lumMod val="75000"/>
+                    <a:alpha val="50000"/>
+                  </a:schemeClr>
+                </a:solidFill>
+              </a:rPr>
+              <a:t>Speed </a:t>
+            </a:r>
+            <a:r>
+              <a:rPr lang="en-US" sz="1600" dirty="0" smtClean="0">
+                <a:solidFill>
+                  <a:schemeClr val="accent6">
+                    <a:lumMod val="75000"/>
+                    <a:alpha val="50000"/>
+                  </a:schemeClr>
+                </a:solidFill>
+              </a:rPr>
+              <a:t>up in data </a:t>
+            </a:r>
+            <a:r>
+              <a:rPr lang="en-US" sz="1600" dirty="0" smtClean="0">
+                <a:solidFill>
+                  <a:schemeClr val="accent6">
+                    <a:lumMod val="75000"/>
+                    <a:alpha val="50000"/>
+                  </a:schemeClr>
+                </a:solidFill>
+              </a:rPr>
+              <a:t>preprocessing</a:t>
+            </a:r>
+          </a:p>
+          <a:p>
+            <a:pPr lvl="1"/>
+            <a:r>
+              <a:rPr lang="en-US" sz="1600" dirty="0">
+                <a:solidFill>
+                  <a:schemeClr val="accent6">
+                    <a:lumMod val="75000"/>
+                    <a:alpha val="50000"/>
+                  </a:schemeClr>
+                </a:solidFill>
+              </a:rPr>
+              <a:t>M</a:t>
+            </a:r>
+            <a:r>
+              <a:rPr lang="en-US" sz="1600" dirty="0" smtClean="0">
+                <a:solidFill>
+                  <a:schemeClr val="accent6">
+                    <a:lumMod val="75000"/>
+                    <a:alpha val="50000"/>
+                  </a:schemeClr>
+                </a:solidFill>
+              </a:rPr>
+              <a:t>ulti-model training</a:t>
+            </a:r>
+          </a:p>
+          <a:p>
+            <a:pPr lvl="1"/>
+            <a:r>
+              <a:rPr lang="en-US" sz="1600" dirty="0">
+                <a:solidFill>
+                  <a:schemeClr val="accent6">
+                    <a:lumMod val="75000"/>
+                    <a:alpha val="50000"/>
+                  </a:schemeClr>
+                </a:solidFill>
+              </a:rPr>
+              <a:t>F</a:t>
+            </a:r>
+            <a:r>
+              <a:rPr lang="en-US" sz="1600" dirty="0" smtClean="0">
+                <a:solidFill>
+                  <a:schemeClr val="accent6">
+                    <a:lumMod val="75000"/>
+                    <a:alpha val="50000"/>
+                  </a:schemeClr>
+                </a:solidFill>
+              </a:rPr>
+              <a:t>ast </a:t>
+            </a:r>
+            <a:r>
+              <a:rPr lang="en-US" sz="1600" dirty="0" smtClean="0">
+                <a:solidFill>
+                  <a:schemeClr val="accent6">
+                    <a:lumMod val="75000"/>
+                    <a:alpha val="50000"/>
+                  </a:schemeClr>
+                </a:solidFill>
+              </a:rPr>
+              <a:t>detection of model quality degradation</a:t>
+            </a:r>
+            <a:endParaRPr lang="en-US" sz="1600" dirty="0">
               <a:solidFill>
                 <a:schemeClr val="accent6">
                   <a:lumMod val="75000"/>
@@ -3665,55 +4193,6 @@
                 </a:schemeClr>
               </a:solidFill>
             </a:endParaRPr>
-          </a:p>
-        </p:txBody>
-      </p:sp>
-      <p:sp>
-        <p:nvSpPr>
-          <p:cNvPr id="14" name="TextBox 13"/>
-          <p:cNvSpPr txBox="1"/>
-          <p:nvPr/>
-        </p:nvSpPr>
-        <p:spPr>
-          <a:xfrm>
-            <a:off x="1667690" y="6294529"/>
-            <a:ext cx="8856617" cy="338554"/>
-          </a:xfrm>
-          <a:prstGeom prst="rect">
-            <a:avLst/>
-          </a:prstGeom>
-          <a:noFill/>
-          <a:ln w="15875">
-            <a:solidFill>
-              <a:schemeClr val="tx1"/>
-            </a:solidFill>
-          </a:ln>
-        </p:spPr>
-        <p:txBody>
-          <a:bodyPr wrap="square" rtlCol="0">
-            <a:spAutoFit/>
-          </a:bodyPr>
-          <a:lstStyle/>
-          <a:p>
-            <a:r>
-              <a:rPr lang="en-US" sz="1600" dirty="0" smtClean="0"/>
-              <a:t>The </a:t>
-            </a:r>
-            <a:r>
-              <a:rPr lang="en-US" sz="1600" dirty="0" smtClean="0">
-                <a:solidFill>
-                  <a:schemeClr val="accent6">
-                    <a:lumMod val="75000"/>
-                  </a:schemeClr>
-                </a:solidFill>
-              </a:rPr>
-              <a:t>green </a:t>
-            </a:r>
-            <a:r>
-              <a:rPr lang="en-US" sz="1600" dirty="0" smtClean="0"/>
-              <a:t>color indicates how Experiment Database can help in optimizing the specific type of workload</a:t>
-            </a:r>
-            <a:endParaRPr lang="en-US" sz="1600" dirty="0"/>
           </a:p>
         </p:txBody>
       </p:sp>
@@ -3965,8 +4444,9 @@
             <a:pPr lvl="1"/>
             <a:r>
               <a:rPr lang="en-US" sz="1900" dirty="0" smtClean="0"/>
-              <a:t>Experiment:</a:t>
-            </a:r>
+              <a:t>Experiments:</a:t>
+            </a:r>
+            <a:endParaRPr lang="en-US" sz="1900" dirty="0" smtClean="0"/>
           </a:p>
           <a:p>
             <a:pPr lvl="2"/>
@@ -3988,8 +4468,13 @@
             </a:r>
             <a:r>
               <a:rPr lang="en-US" sz="1700" dirty="0" smtClean="0"/>
-              <a:t> package*) </a:t>
-            </a:r>
+              <a:t> </a:t>
+            </a:r>
+            <a:r>
+              <a:rPr lang="en-US" sz="1700" dirty="0" smtClean="0"/>
+              <a:t>package) </a:t>
+            </a:r>
+            <a:endParaRPr lang="en-US" sz="1700" dirty="0" smtClean="0"/>
           </a:p>
           <a:p>
             <a:pPr lvl="2"/>
@@ -4003,11 +4488,11 @@
             </a:r>
             <a:r>
               <a:rPr lang="en-US" sz="1700" dirty="0" smtClean="0"/>
-              <a:t> competitions,</a:t>
+              <a:t> </a:t>
             </a:r>
             <a:r>
               <a:rPr lang="en-US" sz="1700" dirty="0" smtClean="0"/>
-              <a:t> </a:t>
+              <a:t>competitions [3], </a:t>
             </a:r>
             <a:r>
               <a:rPr lang="en-US" sz="1700" dirty="0" err="1" smtClean="0"/>
@@ -4015,14 +4500,35 @@
             </a:r>
             <a:r>
               <a:rPr lang="en-US" sz="1700" dirty="0" smtClean="0"/>
-              <a:t> datasets and tasks</a:t>
-            </a:r>
+              <a:t> datasets and </a:t>
+            </a:r>
+            <a:r>
+              <a:rPr lang="en-US" sz="1700" dirty="0" smtClean="0"/>
+              <a:t>tasks [2]</a:t>
+            </a:r>
+            <a:endParaRPr lang="en-US" sz="1700" dirty="0" smtClean="0"/>
           </a:p>
           <a:p>
             <a:pPr lvl="2"/>
             <a:r>
-              <a:rPr lang="en-US" sz="1700" dirty="0" smtClean="0"/>
-              <a:t>Report the reduction in the processing time and the development time</a:t>
+              <a:rPr lang="en-US" sz="1700" dirty="0" smtClean="0">
+                <a:solidFill>
+                  <a:schemeClr val="accent6">
+                    <a:lumMod val="75000"/>
+                  </a:schemeClr>
+                </a:solidFill>
+              </a:rPr>
+              <a:t>I expect a reduction </a:t>
+            </a:r>
+            <a:r>
+              <a:rPr lang="en-US" sz="1700" dirty="0" smtClean="0">
+                <a:solidFill>
+                  <a:schemeClr val="accent6">
+                    <a:lumMod val="75000"/>
+                  </a:schemeClr>
+                </a:solidFill>
+              </a:rPr>
+              <a:t>in the processing time and the development time</a:t>
             </a:r>
           </a:p>
           <a:p>
@@ -4117,7 +4623,23 @@
             <a:pPr lvl="1"/>
             <a:r>
               <a:rPr lang="en-US" sz="2100" dirty="0" smtClean="0"/>
-              <a:t>A simple reuse can save around 2 hours of processing time </a:t>
+              <a:t>Figure below shows that a </a:t>
+            </a:r>
+            <a:r>
+              <a:rPr lang="en-US" sz="2100" dirty="0" smtClean="0"/>
+              <a:t>simple reuse can save </a:t>
+            </a:r>
+            <a:r>
+              <a:rPr lang="en-US" sz="2100" dirty="0" smtClean="0"/>
+              <a:t>about </a:t>
+            </a:r>
+            <a:r>
+              <a:rPr lang="en-US" sz="2100" dirty="0" smtClean="0"/>
+              <a:t>2 </a:t>
+            </a:r>
+            <a:r>
+              <a:rPr lang="en-US" sz="2100" dirty="0" smtClean="0"/>
+              <a:t>hours of processing time </a:t>
             </a:r>
             <a:endParaRPr lang="en-US" sz="2100" dirty="0"/>
           </a:p>

</xml_diff>

<commit_message>
adds Transformation extraction from the openml pipelines
</commit_message>
<xml_diff>
--- a/slides/short-summary.pptx
+++ b/slides/short-summary.pptx
@@ -247,7 +247,7 @@
           <a:p>
             <a:fld id="{3032995D-C81C-1842-8870-7C24B15E6FBE}" type="datetimeFigureOut">
               <a:rPr lang="en-US" smtClean="0"/>
-              <a:t>12/6/17</a:t>
+              <a:t>12/13/17</a:t>
             </a:fld>
             <a:endParaRPr lang="en-US"/>
           </a:p>
@@ -417,7 +417,7 @@
           <a:p>
             <a:fld id="{3032995D-C81C-1842-8870-7C24B15E6FBE}" type="datetimeFigureOut">
               <a:rPr lang="en-US" smtClean="0"/>
-              <a:t>12/6/17</a:t>
+              <a:t>12/13/17</a:t>
             </a:fld>
             <a:endParaRPr lang="en-US"/>
           </a:p>
@@ -597,7 +597,7 @@
           <a:p>
             <a:fld id="{3032995D-C81C-1842-8870-7C24B15E6FBE}" type="datetimeFigureOut">
               <a:rPr lang="en-US" smtClean="0"/>
-              <a:t>12/6/17</a:t>
+              <a:t>12/13/17</a:t>
             </a:fld>
             <a:endParaRPr lang="en-US"/>
           </a:p>
@@ -767,7 +767,7 @@
           <a:p>
             <a:fld id="{3032995D-C81C-1842-8870-7C24B15E6FBE}" type="datetimeFigureOut">
               <a:rPr lang="en-US" smtClean="0"/>
-              <a:t>12/6/17</a:t>
+              <a:t>12/13/17</a:t>
             </a:fld>
             <a:endParaRPr lang="en-US"/>
           </a:p>
@@ -1013,7 +1013,7 @@
           <a:p>
             <a:fld id="{3032995D-C81C-1842-8870-7C24B15E6FBE}" type="datetimeFigureOut">
               <a:rPr lang="en-US" smtClean="0"/>
-              <a:t>12/6/17</a:t>
+              <a:t>12/13/17</a:t>
             </a:fld>
             <a:endParaRPr lang="en-US"/>
           </a:p>
@@ -1245,7 +1245,7 @@
           <a:p>
             <a:fld id="{3032995D-C81C-1842-8870-7C24B15E6FBE}" type="datetimeFigureOut">
               <a:rPr lang="en-US" smtClean="0"/>
-              <a:t>12/6/17</a:t>
+              <a:t>12/13/17</a:t>
             </a:fld>
             <a:endParaRPr lang="en-US"/>
           </a:p>
@@ -1612,7 +1612,7 @@
           <a:p>
             <a:fld id="{3032995D-C81C-1842-8870-7C24B15E6FBE}" type="datetimeFigureOut">
               <a:rPr lang="en-US" smtClean="0"/>
-              <a:t>12/6/17</a:t>
+              <a:t>12/13/17</a:t>
             </a:fld>
             <a:endParaRPr lang="en-US"/>
           </a:p>
@@ -1730,7 +1730,7 @@
           <a:p>
             <a:fld id="{3032995D-C81C-1842-8870-7C24B15E6FBE}" type="datetimeFigureOut">
               <a:rPr lang="en-US" smtClean="0"/>
-              <a:t>12/6/17</a:t>
+              <a:t>12/13/17</a:t>
             </a:fld>
             <a:endParaRPr lang="en-US"/>
           </a:p>
@@ -1825,7 +1825,7 @@
           <a:p>
             <a:fld id="{3032995D-C81C-1842-8870-7C24B15E6FBE}" type="datetimeFigureOut">
               <a:rPr lang="en-US" smtClean="0"/>
-              <a:t>12/6/17</a:t>
+              <a:t>12/13/17</a:t>
             </a:fld>
             <a:endParaRPr lang="en-US"/>
           </a:p>
@@ -2102,7 +2102,7 @@
           <a:p>
             <a:fld id="{3032995D-C81C-1842-8870-7C24B15E6FBE}" type="datetimeFigureOut">
               <a:rPr lang="en-US" smtClean="0"/>
-              <a:t>12/6/17</a:t>
+              <a:t>12/13/17</a:t>
             </a:fld>
             <a:endParaRPr lang="en-US"/>
           </a:p>
@@ -2355,7 +2355,7 @@
           <a:p>
             <a:fld id="{3032995D-C81C-1842-8870-7C24B15E6FBE}" type="datetimeFigureOut">
               <a:rPr lang="en-US" smtClean="0"/>
-              <a:t>12/6/17</a:t>
+              <a:t>12/13/17</a:t>
             </a:fld>
             <a:endParaRPr lang="en-US"/>
           </a:p>
@@ -2568,7 +2568,7 @@
           <a:p>
             <a:fld id="{3032995D-C81C-1842-8870-7C24B15E6FBE}" type="datetimeFigureOut">
               <a:rPr lang="en-US" smtClean="0"/>
-              <a:t>12/6/17</a:t>
+              <a:t>12/13/17</a:t>
             </a:fld>
             <a:endParaRPr lang="en-US"/>
           </a:p>
@@ -3078,11 +3078,7 @@
           <a:p>
             <a:r>
               <a:rPr lang="en-US" dirty="0" smtClean="0"/>
-              <a:t>Experiment </a:t>
-            </a:r>
-            <a:r>
-              <a:rPr lang="en-US" dirty="0" smtClean="0"/>
-              <a:t>Database (ED)</a:t>
+              <a:t>Experiment Database (ED)</a:t>
             </a:r>
             <a:endParaRPr lang="en-US" dirty="0"/>
           </a:p>
@@ -3117,22 +3113,12 @@
               <a:rPr lang="en-US" sz="2400" dirty="0" smtClean="0"/>
               <a:t>evaluations</a:t>
             </a:r>
-            <a:endParaRPr lang="en-US" sz="2400" dirty="0" smtClean="0"/>
           </a:p>
           <a:p>
             <a:r>
               <a:rPr lang="en-US" sz="2400" dirty="0" smtClean="0"/>
-              <a:t>Based on </a:t>
-            </a:r>
-            <a:r>
-              <a:rPr lang="en-US" sz="2400" dirty="0" smtClean="0"/>
-              <a:t>[</a:t>
-            </a:r>
-            <a:r>
-              <a:rPr lang="en-US" sz="2400" dirty="0" smtClean="0"/>
-              <a:t>1] </a:t>
-            </a:r>
-            <a:endParaRPr lang="en-US" sz="2400" dirty="0" smtClean="0"/>
+              <a:t>Based on [1] </a:t>
+            </a:r>
           </a:p>
           <a:p>
             <a:r>
@@ -3392,15 +3378,7 @@
           <a:p>
             <a:r>
               <a:rPr lang="en-US" dirty="0" smtClean="0"/>
-              <a:t>Categories of Machine </a:t>
-            </a:r>
-            <a:r>
-              <a:rPr lang="en-US" dirty="0" smtClean="0"/>
-              <a:t>Learning </a:t>
-            </a:r>
-            <a:r>
-              <a:rPr lang="en-US" dirty="0" smtClean="0"/>
-              <a:t>Workloads</a:t>
+              <a:t>Categories of Machine Learning Workloads</a:t>
             </a:r>
             <a:endParaRPr lang="en-US" dirty="0"/>
           </a:p>
@@ -3437,11 +3415,7 @@
             <a:pPr lvl="1"/>
             <a:r>
               <a:rPr lang="en-US" sz="1900" dirty="0" smtClean="0"/>
-              <a:t>Multi-user </a:t>
-            </a:r>
-            <a:r>
-              <a:rPr lang="en-US" sz="1900" dirty="0" smtClean="0"/>
-              <a:t>(from tens to thousands of users)</a:t>
+              <a:t>Multi-user (from tens to thousands of users)</a:t>
             </a:r>
           </a:p>
           <a:p>
@@ -3529,17 +3503,7 @@
                   </a:schemeClr>
                 </a:solidFill>
               </a:rPr>
-              <a:t>W</a:t>
-            </a:r>
-            <a:r>
-              <a:rPr lang="en-US" sz="1900" dirty="0" smtClean="0">
-                <a:solidFill>
-                  <a:schemeClr val="accent6">
-                    <a:lumMod val="75000"/>
-                  </a:schemeClr>
-                </a:solidFill>
-              </a:rPr>
-              <a:t>arm-starting</a:t>
+              <a:t>Warm-starting</a:t>
             </a:r>
           </a:p>
           <a:p>
@@ -3600,17 +3564,7 @@
                   </a:schemeClr>
                 </a:solidFill>
               </a:rPr>
-              <a:t>Multi-user </a:t>
-            </a:r>
-            <a:r>
-              <a:rPr lang="en-US" sz="1600" dirty="0" smtClean="0">
-                <a:solidFill>
-                  <a:schemeClr val="tx1">
-                    <a:alpha val="50000"/>
-                  </a:schemeClr>
-                </a:solidFill>
-              </a:rPr>
-              <a:t>(tens of users)</a:t>
+              <a:t>Multi-user (tens of users)</a:t>
             </a:r>
           </a:p>
           <a:p>
@@ -3663,10 +3617,13 @@
                   </a:schemeClr>
                 </a:solidFill>
               </a:rPr>
-              <a:t>Speed </a:t>
-            </a:r>
-            <a:r>
-              <a:rPr lang="en-US" sz="1600" dirty="0" smtClean="0">
+              <a:t>Speed up in data transformation</a:t>
+            </a:r>
+          </a:p>
+          <a:p>
+            <a:pPr lvl="1"/>
+            <a:r>
+              <a:rPr lang="en-US" sz="1600" dirty="0">
                 <a:solidFill>
                   <a:schemeClr val="accent6">
                     <a:lumMod val="75000"/>
@@ -3674,7 +3631,7 @@
                   </a:schemeClr>
                 </a:solidFill>
               </a:rPr>
-              <a:t>up in </a:t>
+              <a:t>D</a:t>
             </a:r>
             <a:r>
               <a:rPr lang="en-US" sz="1600" dirty="0" smtClean="0">
@@ -3685,54 +3642,7 @@
                   </a:schemeClr>
                 </a:solidFill>
               </a:rPr>
-              <a:t>data transformation</a:t>
-            </a:r>
-          </a:p>
-          <a:p>
-            <a:pPr lvl="1"/>
-            <a:r>
-              <a:rPr lang="en-US" sz="1600" dirty="0">
-                <a:solidFill>
-                  <a:schemeClr val="accent6">
-                    <a:lumMod val="75000"/>
-                    <a:alpha val="50000"/>
-                  </a:schemeClr>
-                </a:solidFill>
-              </a:rPr>
-              <a:t>D</a:t>
-            </a:r>
-            <a:r>
-              <a:rPr lang="en-US" sz="1600" dirty="0" smtClean="0">
-                <a:solidFill>
-                  <a:schemeClr val="accent6">
-                    <a:lumMod val="75000"/>
-                    <a:alpha val="50000"/>
-                  </a:schemeClr>
-                </a:solidFill>
-              </a:rPr>
-              <a:t>ecreasing </a:t>
-            </a:r>
-            <a:r>
-              <a:rPr lang="en-US" sz="1600" dirty="0" smtClean="0">
-                <a:solidFill>
-                  <a:schemeClr val="accent6">
-                    <a:lumMod val="75000"/>
-                    <a:alpha val="50000"/>
-                  </a:schemeClr>
-                </a:solidFill>
-              </a:rPr>
-              <a:t>the search space of </a:t>
-            </a:r>
-            <a:r>
-              <a:rPr lang="en-US" sz="1600" dirty="0" smtClean="0">
-                <a:solidFill>
-                  <a:schemeClr val="accent6">
-                    <a:lumMod val="75000"/>
-                    <a:alpha val="50000"/>
-                  </a:schemeClr>
-                </a:solidFill>
-              </a:rPr>
-              <a:t>hyper-parameters</a:t>
+              <a:t>ecreasing the search space of hyper-parameters</a:t>
             </a:r>
           </a:p>
           <a:p>
@@ -3837,13 +3747,6 @@
               </a:rPr>
               <a:t>:</a:t>
             </a:r>
-            <a:endParaRPr lang="en-US" sz="2000" dirty="0" smtClean="0">
-              <a:solidFill>
-                <a:schemeClr val="tx1">
-                  <a:alpha val="50000"/>
-                </a:schemeClr>
-              </a:solidFill>
-            </a:endParaRPr>
           </a:p>
           <a:p>
             <a:pPr lvl="1"/>
@@ -3855,17 +3758,7 @@
                   </a:schemeClr>
                 </a:solidFill>
               </a:rPr>
-              <a:t>Real-time </a:t>
-            </a:r>
-            <a:r>
-              <a:rPr lang="en-US" sz="1600" dirty="0" smtClean="0">
-                <a:solidFill>
-                  <a:schemeClr val="tx1">
-                    <a:alpha val="50000"/>
-                  </a:schemeClr>
-                </a:solidFill>
-              </a:rPr>
-              <a:t>(or near real-time) data processing</a:t>
+              <a:t>Real-time (or near real-time) data processing</a:t>
             </a:r>
           </a:p>
           <a:p>
@@ -3915,14 +3808,6 @@
               </a:rPr>
               <a:t>:</a:t>
             </a:r>
-            <a:endParaRPr lang="en-US" sz="2000" dirty="0" smtClean="0">
-              <a:solidFill>
-                <a:schemeClr val="accent6">
-                  <a:lumMod val="75000"/>
-                  <a:alpha val="50000"/>
-                </a:schemeClr>
-              </a:solidFill>
-            </a:endParaRPr>
           </a:p>
           <a:p>
             <a:pPr lvl="1"/>
@@ -3935,10 +3820,13 @@
                   </a:schemeClr>
                 </a:solidFill>
               </a:rPr>
-              <a:t>Speed </a:t>
-            </a:r>
-            <a:r>
-              <a:rPr lang="en-US" sz="1600" dirty="0" smtClean="0">
+              <a:t>Speed up in data preprocessing</a:t>
+            </a:r>
+          </a:p>
+          <a:p>
+            <a:pPr lvl="1"/>
+            <a:r>
+              <a:rPr lang="en-US" sz="1600" dirty="0">
                 <a:solidFill>
                   <a:schemeClr val="accent6">
                     <a:lumMod val="75000"/>
@@ -3946,7 +3834,7 @@
                   </a:schemeClr>
                 </a:solidFill>
               </a:rPr>
-              <a:t>up in data </a:t>
+              <a:t>M</a:t>
             </a:r>
             <a:r>
               <a:rPr lang="en-US" sz="1600" dirty="0" smtClean="0">
@@ -3957,7 +3845,7 @@
                   </a:schemeClr>
                 </a:solidFill>
               </a:rPr>
-              <a:t>preprocessing</a:t>
+              <a:t>ulti-model training</a:t>
             </a:r>
           </a:p>
           <a:p>
@@ -3971,7 +3859,7 @@
                   </a:schemeClr>
                 </a:solidFill>
               </a:rPr>
-              <a:t>M</a:t>
+              <a:t>F</a:t>
             </a:r>
             <a:r>
               <a:rPr lang="en-US" sz="1600" dirty="0" smtClean="0">
@@ -3982,43 +3870,7 @@
                   </a:schemeClr>
                 </a:solidFill>
               </a:rPr>
-              <a:t>ulti-model training</a:t>
-            </a:r>
-          </a:p>
-          <a:p>
-            <a:pPr lvl="1"/>
-            <a:r>
-              <a:rPr lang="en-US" sz="1600" dirty="0">
-                <a:solidFill>
-                  <a:schemeClr val="accent6">
-                    <a:lumMod val="75000"/>
-                    <a:alpha val="50000"/>
-                  </a:schemeClr>
-                </a:solidFill>
-              </a:rPr>
-              <a:t>F</a:t>
-            </a:r>
-            <a:r>
-              <a:rPr lang="en-US" sz="1600" dirty="0" smtClean="0">
-                <a:solidFill>
-                  <a:schemeClr val="accent6">
-                    <a:lumMod val="75000"/>
-                    <a:alpha val="50000"/>
-                  </a:schemeClr>
-                </a:solidFill>
-              </a:rPr>
-              <a:t>ast </a:t>
-            </a:r>
-            <a:r>
-              <a:rPr lang="en-US" sz="1600" dirty="0" smtClean="0">
-                <a:solidFill>
-                  <a:schemeClr val="accent6">
-                    <a:lumMod val="75000"/>
-                    <a:alpha val="50000"/>
-                  </a:schemeClr>
-                </a:solidFill>
-              </a:rPr>
-              <a:t>detection of model quality degradation</a:t>
+              <a:t>ast detection of model quality degradation</a:t>
             </a:r>
             <a:endParaRPr lang="en-US" sz="1600" dirty="0">
               <a:solidFill>
@@ -4446,7 +4298,6 @@
               <a:rPr lang="en-US" sz="1900" dirty="0" smtClean="0"/>
               <a:t>Experiments:</a:t>
             </a:r>
-            <a:endParaRPr lang="en-US" sz="1900" dirty="0" smtClean="0"/>
           </a:p>
           <a:p>
             <a:pPr lvl="2"/>
@@ -4468,13 +4319,8 @@
             </a:r>
             <a:r>
               <a:rPr lang="en-US" sz="1700" dirty="0" smtClean="0"/>
-              <a:t> </a:t>
-            </a:r>
-            <a:r>
-              <a:rPr lang="en-US" sz="1700" dirty="0" smtClean="0"/>
-              <a:t>package) </a:t>
-            </a:r>
-            <a:endParaRPr lang="en-US" sz="1700" dirty="0" smtClean="0"/>
+              <a:t> package) </a:t>
+            </a:r>
           </a:p>
           <a:p>
             <a:pPr lvl="2"/>
@@ -4488,11 +4334,7 @@
             </a:r>
             <a:r>
               <a:rPr lang="en-US" sz="1700" dirty="0" smtClean="0"/>
-              <a:t> </a:t>
-            </a:r>
-            <a:r>
-              <a:rPr lang="en-US" sz="1700" dirty="0" smtClean="0"/>
-              <a:t>competitions [3], </a:t>
+              <a:t> competitions [3], </a:t>
             </a:r>
             <a:r>
               <a:rPr lang="en-US" sz="1700" dirty="0" err="1" smtClean="0"/>
@@ -4500,13 +4342,8 @@
             </a:r>
             <a:r>
               <a:rPr lang="en-US" sz="1700" dirty="0" smtClean="0"/>
-              <a:t> datasets and </a:t>
-            </a:r>
-            <a:r>
-              <a:rPr lang="en-US" sz="1700" dirty="0" smtClean="0"/>
-              <a:t>tasks [2]</a:t>
-            </a:r>
-            <a:endParaRPr lang="en-US" sz="1700" dirty="0" smtClean="0"/>
+              <a:t> datasets and tasks [2]</a:t>
+            </a:r>
           </a:p>
           <a:p>
             <a:pPr lvl="2"/>
@@ -4518,17 +4355,7 @@
                   </a:schemeClr>
                 </a:solidFill>
               </a:rPr>
-              <a:t>I expect a reduction </a:t>
-            </a:r>
-            <a:r>
-              <a:rPr lang="en-US" sz="1700" dirty="0" smtClean="0">
-                <a:solidFill>
-                  <a:schemeClr val="accent6">
-                    <a:lumMod val="75000"/>
-                  </a:schemeClr>
-                </a:solidFill>
-              </a:rPr>
-              <a:t>in the processing time and the development time</a:t>
+              <a:t>I expect a reduction in the processing time and the development time</a:t>
             </a:r>
           </a:p>
           <a:p>
@@ -4537,8 +4364,17 @@
           <a:p>
             <a:r>
               <a:rPr lang="en-US" sz="1900" dirty="0" smtClean="0"/>
-              <a:t>I currently have a paper under review for SIGMOD2018. Depending on the result of the review, this work may have to be pushed back to SIGMOD2019/VLDB2018</a:t>
-            </a:r>
+              <a:t>I currently have a paper under review for SIGMOD2018. Depending on the result of the review, this work may have to be pushed back </a:t>
+            </a:r>
+            <a:r>
+              <a:rPr lang="en-US" sz="1900" smtClean="0"/>
+              <a:t>to </a:t>
+            </a:r>
+            <a:r>
+              <a:rPr lang="en-US" sz="1900" smtClean="0"/>
+              <a:t>SIGMOD2019/VLDB2019</a:t>
+            </a:r>
+            <a:endParaRPr lang="en-US" sz="1900" dirty="0" smtClean="0"/>
           </a:p>
         </p:txBody>
       </p:sp>
@@ -4623,23 +4459,7 @@
             <a:pPr lvl="1"/>
             <a:r>
               <a:rPr lang="en-US" sz="2100" dirty="0" smtClean="0"/>
-              <a:t>Figure below shows that a </a:t>
-            </a:r>
-            <a:r>
-              <a:rPr lang="en-US" sz="2100" dirty="0" smtClean="0"/>
-              <a:t>simple reuse can save </a:t>
-            </a:r>
-            <a:r>
-              <a:rPr lang="en-US" sz="2100" dirty="0" smtClean="0"/>
-              <a:t>about </a:t>
-            </a:r>
-            <a:r>
-              <a:rPr lang="en-US" sz="2100" dirty="0" smtClean="0"/>
-              <a:t>2 </a:t>
-            </a:r>
-            <a:r>
-              <a:rPr lang="en-US" sz="2100" dirty="0" smtClean="0"/>
-              <a:t>hours of processing time </a:t>
+              <a:t>Figure below shows that a simple reuse can save about 2 hours of processing time </a:t>
             </a:r>
             <a:endParaRPr lang="en-US" sz="2100" dirty="0"/>
           </a:p>

</xml_diff>